<commit_message>
Completed the first complete draft of the manuscript
</commit_message>
<xml_diff>
--- a/Manuscript/Figures/03_Methods_Areal_Difference_ECDF.pptx
+++ b/Manuscript/Figures/03_Methods_Areal_Difference_ECDF.pptx
@@ -104,13 +104,18 @@
       </a:defRPr>
     </a:lvl9pPr>
   </p:defaultTextStyle>
+  <p:extLst>
+    <p:ext uri="{EFAFB233-063F-42B5-8137-9DF3F51BA10A}">
+      <p15:sldGuideLst xmlns:p15="http://schemas.microsoft.com/office/powerpoint/2012/main"/>
+    </p:ext>
+  </p:extLst>
 </p:presentation>
 </file>
 
 <file path=ppt/revisionInfo.xml><?xml version="1.0" encoding="utf-8"?>
 <p1510:revInfo xmlns:a="http://schemas.openxmlformats.org/drawingml/2006/main" xmlns:r="http://schemas.openxmlformats.org/officeDocument/2006/relationships" xmlns:p1510="http://schemas.microsoft.com/office/powerpoint/2015/10/main">
   <p1510:revLst>
-    <p1510:client id="{F284ADA1-1EB4-4A8C-BA15-AACC3C37395A}" v="69" dt="2024-09-28T22:32:27.275"/>
+    <p1510:client id="{DA1F4A9B-219D-46F3-84F5-C69261867DD7}" v="17" dt="2024-10-01T15:21:52.985"/>
   </p1510:revLst>
 </p1510:revInfo>
 </file>
@@ -605,6 +610,30 @@
       </pc:sldChg>
     </pc:docChg>
   </pc:docChgLst>
+  <pc:docChgLst>
+    <pc:chgData name="Fatima Pillosu" userId="a6295d4dc9e22643" providerId="LiveId" clId="{DA1F4A9B-219D-46F3-84F5-C69261867DD7}"/>
+    <pc:docChg chg="modSld">
+      <pc:chgData name="Fatima Pillosu" userId="a6295d4dc9e22643" providerId="LiveId" clId="{DA1F4A9B-219D-46F3-84F5-C69261867DD7}" dt="2024-10-01T15:21:52.985" v="38" actId="20577"/>
+      <pc:docMkLst>
+        <pc:docMk/>
+      </pc:docMkLst>
+      <pc:sldChg chg="modSp mod">
+        <pc:chgData name="Fatima Pillosu" userId="a6295d4dc9e22643" providerId="LiveId" clId="{DA1F4A9B-219D-46F3-84F5-C69261867DD7}" dt="2024-10-01T15:21:52.985" v="38" actId="20577"/>
+        <pc:sldMkLst>
+          <pc:docMk/>
+          <pc:sldMk cId="2139022139" sldId="256"/>
+        </pc:sldMkLst>
+        <pc:spChg chg="mod">
+          <ac:chgData name="Fatima Pillosu" userId="a6295d4dc9e22643" providerId="LiveId" clId="{DA1F4A9B-219D-46F3-84F5-C69261867DD7}" dt="2024-10-01T15:21:52.985" v="38" actId="20577"/>
+          <ac:spMkLst>
+            <pc:docMk/>
+            <pc:sldMk cId="2139022139" sldId="256"/>
+            <ac:spMk id="99" creationId="{E31EE861-0E35-3F34-0BA4-9BB1EE19970D}"/>
+          </ac:spMkLst>
+        </pc:spChg>
+      </pc:sldChg>
+    </pc:docChg>
+  </pc:docChgLst>
 </pc:chgInfo>
 </file>
 
@@ -739,7 +768,7 @@
           <a:p>
             <a:fld id="{2E84B11B-7DB5-41E0-B708-95A5B06B96C5}" type="datetimeFigureOut">
               <a:rPr lang="en-GB" smtClean="0"/>
-              <a:t>28/09/2024</a:t>
+              <a:t>01/10/2024</a:t>
             </a:fld>
             <a:endParaRPr lang="en-GB"/>
           </a:p>
@@ -909,7 +938,7 @@
           <a:p>
             <a:fld id="{2E84B11B-7DB5-41E0-B708-95A5B06B96C5}" type="datetimeFigureOut">
               <a:rPr lang="en-GB" smtClean="0"/>
-              <a:t>28/09/2024</a:t>
+              <a:t>01/10/2024</a:t>
             </a:fld>
             <a:endParaRPr lang="en-GB"/>
           </a:p>
@@ -1089,7 +1118,7 @@
           <a:p>
             <a:fld id="{2E84B11B-7DB5-41E0-B708-95A5B06B96C5}" type="datetimeFigureOut">
               <a:rPr lang="en-GB" smtClean="0"/>
-              <a:t>28/09/2024</a:t>
+              <a:t>01/10/2024</a:t>
             </a:fld>
             <a:endParaRPr lang="en-GB"/>
           </a:p>
@@ -1259,7 +1288,7 @@
           <a:p>
             <a:fld id="{2E84B11B-7DB5-41E0-B708-95A5B06B96C5}" type="datetimeFigureOut">
               <a:rPr lang="en-GB" smtClean="0"/>
-              <a:t>28/09/2024</a:t>
+              <a:t>01/10/2024</a:t>
             </a:fld>
             <a:endParaRPr lang="en-GB"/>
           </a:p>
@@ -1505,7 +1534,7 @@
           <a:p>
             <a:fld id="{2E84B11B-7DB5-41E0-B708-95A5B06B96C5}" type="datetimeFigureOut">
               <a:rPr lang="en-GB" smtClean="0"/>
-              <a:t>28/09/2024</a:t>
+              <a:t>01/10/2024</a:t>
             </a:fld>
             <a:endParaRPr lang="en-GB"/>
           </a:p>
@@ -1737,7 +1766,7 @@
           <a:p>
             <a:fld id="{2E84B11B-7DB5-41E0-B708-95A5B06B96C5}" type="datetimeFigureOut">
               <a:rPr lang="en-GB" smtClean="0"/>
-              <a:t>28/09/2024</a:t>
+              <a:t>01/10/2024</a:t>
             </a:fld>
             <a:endParaRPr lang="en-GB"/>
           </a:p>
@@ -2104,7 +2133,7 @@
           <a:p>
             <a:fld id="{2E84B11B-7DB5-41E0-B708-95A5B06B96C5}" type="datetimeFigureOut">
               <a:rPr lang="en-GB" smtClean="0"/>
-              <a:t>28/09/2024</a:t>
+              <a:t>01/10/2024</a:t>
             </a:fld>
             <a:endParaRPr lang="en-GB"/>
           </a:p>
@@ -2222,7 +2251,7 @@
           <a:p>
             <a:fld id="{2E84B11B-7DB5-41E0-B708-95A5B06B96C5}" type="datetimeFigureOut">
               <a:rPr lang="en-GB" smtClean="0"/>
-              <a:t>28/09/2024</a:t>
+              <a:t>01/10/2024</a:t>
             </a:fld>
             <a:endParaRPr lang="en-GB"/>
           </a:p>
@@ -2317,7 +2346,7 @@
           <a:p>
             <a:fld id="{2E84B11B-7DB5-41E0-B708-95A5B06B96C5}" type="datetimeFigureOut">
               <a:rPr lang="en-GB" smtClean="0"/>
-              <a:t>28/09/2024</a:t>
+              <a:t>01/10/2024</a:t>
             </a:fld>
             <a:endParaRPr lang="en-GB"/>
           </a:p>
@@ -2594,7 +2623,7 @@
           <a:p>
             <a:fld id="{2E84B11B-7DB5-41E0-B708-95A5B06B96C5}" type="datetimeFigureOut">
               <a:rPr lang="en-GB" smtClean="0"/>
-              <a:t>28/09/2024</a:t>
+              <a:t>01/10/2024</a:t>
             </a:fld>
             <a:endParaRPr lang="en-GB"/>
           </a:p>
@@ -2851,7 +2880,7 @@
           <a:p>
             <a:fld id="{2E84B11B-7DB5-41E0-B708-95A5B06B96C5}" type="datetimeFigureOut">
               <a:rPr lang="en-GB" smtClean="0"/>
-              <a:t>28/09/2024</a:t>
+              <a:t>01/10/2024</a:t>
             </a:fld>
             <a:endParaRPr lang="en-GB"/>
           </a:p>
@@ -3064,7 +3093,7 @@
           <a:p>
             <a:fld id="{2E84B11B-7DB5-41E0-B708-95A5B06B96C5}" type="datetimeFigureOut">
               <a:rPr lang="en-GB" smtClean="0"/>
-              <a:t>28/09/2024</a:t>
+              <a:t>01/10/2024</a:t>
             </a:fld>
             <a:endParaRPr lang="en-GB"/>
           </a:p>
@@ -5302,7 +5331,7 @@
             <p:spPr>
               <a:xfrm>
                 <a:off x="1626522" y="1450974"/>
-                <a:ext cx="2135853" cy="400110"/>
+                <a:ext cx="2327640" cy="400110"/>
               </a:xfrm>
               <a:prstGeom prst="rect">
                 <a:avLst/>
@@ -5357,7 +5386,7 @@
                       <m:naryPr>
                         <m:chr m:val="∑"/>
                         <m:ctrlPr>
-                          <a:rPr lang="en-GB" sz="1000" smtClean="0">
+                          <a:rPr lang="en-GB" sz="1000" i="1" smtClean="0">
                             <a:solidFill>
                               <a:schemeClr val="accent5">
                                 <a:lumMod val="60000"/>
@@ -5432,7 +5461,7 @@
                           <m:t>abs</m:t>
                         </m:r>
                         <m:r>
-                          <a:rPr lang="en-GB" sz="1000" b="0" i="0" smtClean="0">
+                          <a:rPr lang="en-US" sz="1000" b="0" i="0" smtClean="0">
                             <a:solidFill>
                               <a:schemeClr val="accent5">
                                 <a:lumMod val="60000"/>
@@ -5441,7 +5470,7 @@
                             </a:solidFill>
                             <a:latin typeface="Cambria Math" panose="02040503050406030204" pitchFamily="18" charset="0"/>
                           </a:rPr>
-                          <m:t>(</m:t>
+                          <m:t>[</m:t>
                         </m:r>
                         <m:r>
                           <m:rPr>
@@ -5456,12 +5485,27 @@
                             </a:solidFill>
                             <a:latin typeface="Cambria Math" panose="02040503050406030204" pitchFamily="18" charset="0"/>
                           </a:rPr>
-                          <m:t>ECDFdiff</m:t>
+                          <m:t>ECDF</m:t>
+                        </m:r>
+                        <m:r>
+                          <m:rPr>
+                            <m:sty m:val="p"/>
+                          </m:rPr>
+                          <a:rPr lang="en-GB" sz="1000" b="0" i="0" baseline="-25000" smtClean="0">
+                            <a:solidFill>
+                              <a:schemeClr val="accent5">
+                                <a:lumMod val="60000"/>
+                                <a:lumOff val="40000"/>
+                              </a:schemeClr>
+                            </a:solidFill>
+                            <a:latin typeface="Cambria Math" panose="02040503050406030204" pitchFamily="18" charset="0"/>
+                          </a:rPr>
+                          <m:t>diff</m:t>
                         </m:r>
                         <m:d>
                           <m:dPr>
                             <m:ctrlPr>
-                              <a:rPr lang="en-GB" sz="1000" b="0" smtClean="0">
+                              <a:rPr lang="en-GB" sz="1000" b="0" i="1" smtClean="0">
                                 <a:solidFill>
                                   <a:schemeClr val="accent5">
                                     <a:lumMod val="60000"/>
@@ -5491,7 +5535,7 @@
                           </m:e>
                         </m:d>
                         <m:r>
-                          <a:rPr lang="en-GB" sz="1000" b="0" i="0" smtClean="0">
+                          <a:rPr lang="en-US" sz="1000" b="0" i="0" smtClean="0">
                             <a:solidFill>
                               <a:schemeClr val="accent5">
                                 <a:lumMod val="60000"/>
@@ -5500,7 +5544,7 @@
                             </a:solidFill>
                             <a:latin typeface="Cambria Math" panose="02040503050406030204" pitchFamily="18" charset="0"/>
                           </a:rPr>
-                          <m:t>)</m:t>
+                          <m:t>]</m:t>
                         </m:r>
                       </m:e>
                     </m:nary>
@@ -5530,7 +5574,7 @@
                     </a:solidFill>
                     <a:latin typeface="Aptos" panose="020B0004020202020204" pitchFamily="34" charset="0"/>
                   </a:rPr>
-                  <a:t>with n = 1 to 99 percentiles</a:t>
+                  <a:t>with n = 99</a:t>
                 </a:r>
               </a:p>
             </p:txBody>
@@ -5554,7 +5598,7 @@
             <p:spPr>
               <a:xfrm>
                 <a:off x="1626522" y="1450974"/>
-                <a:ext cx="2135853" cy="400110"/>
+                <a:ext cx="2327640" cy="400110"/>
               </a:xfrm>
               <a:prstGeom prst="rect">
                 <a:avLst/>

</xml_diff>